<commit_message>
Organizing the Reuters Data
</commit_message>
<xml_diff>
--- a/Tutorial_03/Tutorial 3 - Word Vector Representation.pptx
+++ b/Tutorial_03/Tutorial 3 - Word Vector Representation.pptx
@@ -287,7 +287,7 @@
       </p15:sldGuideLst>
     </p:ext>
     <p:ext uri="http://customooxmlschemas.google.com/">
-      <go:slidesCustomData xmlns:go="http://customooxmlschemas.google.com/" xmlns:ahyp="http://schemas.microsoft.com/office/drawing/2018/hyperlinkcolor" xmlns:p15="http://schemas.microsoft.com/office/powerpoint/2012/main" xmlns:p14="http://schemas.microsoft.com/office/powerpoint/2010/main" xmlns:com="http://schemas.openxmlformats.org/drawingml/2006/compatibility" xmlns:pvml="urn:schemas-microsoft-com:office:powerpoint" xmlns:v="urn:schemas-microsoft-com:vml" xmlns:o="urn:schemas-microsoft-com:office:office" xmlns:dgm="http://schemas.openxmlformats.org/drawingml/2006/diagram" xmlns:c="http://schemas.openxmlformats.org/drawingml/2006/chart" xmlns:mv="urn:schemas-microsoft-com:mac:vml" xmlns:mc="http://schemas.openxmlformats.org/markup-compatibility/2006" xmlns="" r:id="rId43" roundtripDataSignature="AMtx7mjZmF4dMLQr+yZDM7ocQPQNnLPQag=="/>
+      <go:slidesCustomData xmlns="" xmlns:mc="http://schemas.openxmlformats.org/markup-compatibility/2006" xmlns:mv="urn:schemas-microsoft-com:mac:vml" xmlns:c="http://schemas.openxmlformats.org/drawingml/2006/chart" xmlns:dgm="http://schemas.openxmlformats.org/drawingml/2006/diagram" xmlns:o="urn:schemas-microsoft-com:office:office" xmlns:v="urn:schemas-microsoft-com:vml" xmlns:pvml="urn:schemas-microsoft-com:office:powerpoint" xmlns:com="http://schemas.openxmlformats.org/drawingml/2006/compatibility" xmlns:p14="http://schemas.microsoft.com/office/powerpoint/2010/main" xmlns:p15="http://schemas.microsoft.com/office/powerpoint/2012/main" xmlns:ahyp="http://schemas.microsoft.com/office/drawing/2018/hyperlinkcolor" xmlns:go="http://customooxmlschemas.google.com/" r:id="rId43" roundtripDataSignature="AMtx7mjZmF4dMLQr+yZDM7ocQPQNnLPQag=="/>
     </p:ext>
   </p:extLst>
 </p:presentation>
@@ -14665,8 +14665,8 @@
           </a:p>
         </p:txBody>
       </p:sp>
-      <mc:AlternateContent xmlns:mc="http://schemas.openxmlformats.org/markup-compatibility/2006">
-        <mc:Choice xmlns:a14="http://schemas.microsoft.com/office/drawing/2010/main" Requires="a14">
+      <mc:AlternateContent xmlns:mc="http://schemas.openxmlformats.org/markup-compatibility/2006" xmlns:a14="http://schemas.microsoft.com/office/drawing/2010/main">
+        <mc:Choice Requires="a14">
           <p:sp>
             <p:nvSpPr>
               <p:cNvPr id="3" name="Text Placeholder 2">
@@ -15258,7 +15258,7 @@
             </p:txBody>
           </p:sp>
         </mc:Choice>
-        <mc:Fallback>
+        <mc:Fallback xmlns="">
           <p:sp>
             <p:nvSpPr>
               <p:cNvPr id="3" name="Text Placeholder 2">

</xml_diff>